<commit_message>
5th task ansible and disk part is completed missing jenkins
</commit_message>
<xml_diff>
--- a/4.Ansible/Presentation.pptx
+++ b/4.Ansible/Presentation.pptx
@@ -259,7 +259,7 @@
           <a:p>
             <a:fld id="{5C4D43A2-CC02-4CD8-AEF3-2A533F3C60AF}" type="datetimeFigureOut">
               <a:rPr lang="en-US" smtClean="0"/>
-              <a:t>10/26/2023</a:t>
+              <a:t>11/8/2023</a:t>
             </a:fld>
             <a:endParaRPr lang="en-US"/>
           </a:p>
@@ -457,7 +457,7 @@
           <a:p>
             <a:fld id="{5C4D43A2-CC02-4CD8-AEF3-2A533F3C60AF}" type="datetimeFigureOut">
               <a:rPr lang="en-US" smtClean="0"/>
-              <a:t>10/26/2023</a:t>
+              <a:t>11/8/2023</a:t>
             </a:fld>
             <a:endParaRPr lang="en-US"/>
           </a:p>
@@ -665,7 +665,7 @@
           <a:p>
             <a:fld id="{5C4D43A2-CC02-4CD8-AEF3-2A533F3C60AF}" type="datetimeFigureOut">
               <a:rPr lang="en-US" smtClean="0"/>
-              <a:t>10/26/2023</a:t>
+              <a:t>11/8/2023</a:t>
             </a:fld>
             <a:endParaRPr lang="en-US"/>
           </a:p>
@@ -863,7 +863,7 @@
           <a:p>
             <a:fld id="{5C4D43A2-CC02-4CD8-AEF3-2A533F3C60AF}" type="datetimeFigureOut">
               <a:rPr lang="en-US" smtClean="0"/>
-              <a:t>10/26/2023</a:t>
+              <a:t>11/8/2023</a:t>
             </a:fld>
             <a:endParaRPr lang="en-US"/>
           </a:p>
@@ -1138,7 +1138,7 @@
           <a:p>
             <a:fld id="{5C4D43A2-CC02-4CD8-AEF3-2A533F3C60AF}" type="datetimeFigureOut">
               <a:rPr lang="en-US" smtClean="0"/>
-              <a:t>10/26/2023</a:t>
+              <a:t>11/8/2023</a:t>
             </a:fld>
             <a:endParaRPr lang="en-US"/>
           </a:p>
@@ -1403,7 +1403,7 @@
           <a:p>
             <a:fld id="{5C4D43A2-CC02-4CD8-AEF3-2A533F3C60AF}" type="datetimeFigureOut">
               <a:rPr lang="en-US" smtClean="0"/>
-              <a:t>10/26/2023</a:t>
+              <a:t>11/8/2023</a:t>
             </a:fld>
             <a:endParaRPr lang="en-US"/>
           </a:p>
@@ -1815,7 +1815,7 @@
           <a:p>
             <a:fld id="{5C4D43A2-CC02-4CD8-AEF3-2A533F3C60AF}" type="datetimeFigureOut">
               <a:rPr lang="en-US" smtClean="0"/>
-              <a:t>10/26/2023</a:t>
+              <a:t>11/8/2023</a:t>
             </a:fld>
             <a:endParaRPr lang="en-US"/>
           </a:p>
@@ -1956,7 +1956,7 @@
           <a:p>
             <a:fld id="{5C4D43A2-CC02-4CD8-AEF3-2A533F3C60AF}" type="datetimeFigureOut">
               <a:rPr lang="en-US" smtClean="0"/>
-              <a:t>10/26/2023</a:t>
+              <a:t>11/8/2023</a:t>
             </a:fld>
             <a:endParaRPr lang="en-US"/>
           </a:p>
@@ -2069,7 +2069,7 @@
           <a:p>
             <a:fld id="{5C4D43A2-CC02-4CD8-AEF3-2A533F3C60AF}" type="datetimeFigureOut">
               <a:rPr lang="en-US" smtClean="0"/>
-              <a:t>10/26/2023</a:t>
+              <a:t>11/8/2023</a:t>
             </a:fld>
             <a:endParaRPr lang="en-US"/>
           </a:p>
@@ -2380,7 +2380,7 @@
           <a:p>
             <a:fld id="{5C4D43A2-CC02-4CD8-AEF3-2A533F3C60AF}" type="datetimeFigureOut">
               <a:rPr lang="en-US" smtClean="0"/>
-              <a:t>10/26/2023</a:t>
+              <a:t>11/8/2023</a:t>
             </a:fld>
             <a:endParaRPr lang="en-US"/>
           </a:p>
@@ -2668,7 +2668,7 @@
           <a:p>
             <a:fld id="{5C4D43A2-CC02-4CD8-AEF3-2A533F3C60AF}" type="datetimeFigureOut">
               <a:rPr lang="en-US" smtClean="0"/>
-              <a:t>10/26/2023</a:t>
+              <a:t>11/8/2023</a:t>
             </a:fld>
             <a:endParaRPr lang="en-US"/>
           </a:p>
@@ -2909,7 +2909,7 @@
           <a:p>
             <a:fld id="{5C4D43A2-CC02-4CD8-AEF3-2A533F3C60AF}" type="datetimeFigureOut">
               <a:rPr lang="en-US" smtClean="0"/>
-              <a:t>10/26/2023</a:t>
+              <a:t>11/8/2023</a:t>
             </a:fld>
             <a:endParaRPr lang="en-US"/>
           </a:p>
@@ -3962,7 +3962,7 @@
           <a:p>
             <a:r>
               <a:rPr lang="en-US" sz="1200" dirty="0"/>
-              <a:t>192.168.1.101</a:t>
+              <a:t>192.168.1.103</a:t>
             </a:r>
           </a:p>
           <a:p>
@@ -4381,7 +4381,7 @@
         </p:nvSpPr>
         <p:spPr>
           <a:xfrm>
-            <a:off x="7289761" y="1587660"/>
+            <a:off x="7711947" y="1593837"/>
             <a:ext cx="443968" cy="276999"/>
           </a:xfrm>
           <a:prstGeom prst="rect">
@@ -4548,6 +4548,144 @@
           <a:p>
             <a:pPr algn="ctr"/>
             <a:endParaRPr lang="en-US"/>
+          </a:p>
+        </p:txBody>
+      </p:sp>
+      <p:pic>
+        <p:nvPicPr>
+          <p:cNvPr id="1028" name="Picture 4" descr="Ansible&quot; Icon - Download for free – Iconduck">
+            <a:extLst>
+              <a:ext uri="{FF2B5EF4-FFF2-40B4-BE49-F238E27FC236}">
+                <a16:creationId xmlns:a16="http://schemas.microsoft.com/office/drawing/2014/main" id="{40240CBF-61FA-4EB0-8F4A-4DB5A9667D6F}"/>
+              </a:ext>
+            </a:extLst>
+          </p:cNvPr>
+          <p:cNvPicPr>
+            <a:picLocks noChangeAspect="1" noChangeArrowheads="1"/>
+          </p:cNvPicPr>
+          <p:nvPr/>
+        </p:nvPicPr>
+        <p:blipFill>
+          <a:blip r:embed="rId7">
+            <a:extLst>
+              <a:ext uri="{28A0092B-C50C-407E-A947-70E740481C1C}">
+                <a14:useLocalDpi xmlns:a14="http://schemas.microsoft.com/office/drawing/2010/main" val="0"/>
+              </a:ext>
+            </a:extLst>
+          </a:blip>
+          <a:srcRect/>
+          <a:stretch>
+            <a:fillRect/>
+          </a:stretch>
+        </p:blipFill>
+        <p:spPr bwMode="auto">
+          <a:xfrm>
+            <a:off x="2142776" y="1709367"/>
+            <a:ext cx="283850" cy="283850"/>
+          </a:xfrm>
+          <a:prstGeom prst="rect">
+            <a:avLst/>
+          </a:prstGeom>
+          <a:noFill/>
+          <a:extLst>
+            <a:ext uri="{909E8E84-426E-40DD-AFC4-6F175D3DCCD1}">
+              <a14:hiddenFill xmlns:a14="http://schemas.microsoft.com/office/drawing/2010/main">
+                <a:solidFill>
+                  <a:srgbClr val="FFFFFF"/>
+                </a:solidFill>
+              </a14:hiddenFill>
+            </a:ext>
+          </a:extLst>
+        </p:spPr>
+      </p:pic>
+      <p:sp>
+        <p:nvSpPr>
+          <p:cNvPr id="31" name="Rectangle 30">
+            <a:extLst>
+              <a:ext uri="{FF2B5EF4-FFF2-40B4-BE49-F238E27FC236}">
+                <a16:creationId xmlns:a16="http://schemas.microsoft.com/office/drawing/2014/main" id="{143A0A94-E95F-4599-AAE2-E4532B8A0A4F}"/>
+              </a:ext>
+            </a:extLst>
+          </p:cNvPr>
+          <p:cNvSpPr/>
+          <p:nvPr/>
+        </p:nvSpPr>
+        <p:spPr>
+          <a:xfrm>
+            <a:off x="1658035" y="471242"/>
+            <a:ext cx="5862089" cy="5649720"/>
+          </a:xfrm>
+          <a:prstGeom prst="rect">
+            <a:avLst/>
+          </a:prstGeom>
+          <a:noFill/>
+          <a:ln>
+            <a:prstDash val="sysDot"/>
+          </a:ln>
+        </p:spPr>
+        <p:style>
+          <a:lnRef idx="2">
+            <a:schemeClr val="accent1"/>
+          </a:lnRef>
+          <a:fillRef idx="1">
+            <a:schemeClr val="lt1"/>
+          </a:fillRef>
+          <a:effectRef idx="0">
+            <a:schemeClr val="accent1"/>
+          </a:effectRef>
+          <a:fontRef idx="minor">
+            <a:schemeClr val="dk1"/>
+          </a:fontRef>
+        </p:style>
+        <p:txBody>
+          <a:bodyPr rtlCol="0" anchor="ctr"/>
+          <a:lstStyle/>
+          <a:p>
+            <a:pPr algn="ctr"/>
+            <a:endParaRPr lang="en-US"/>
+          </a:p>
+        </p:txBody>
+      </p:sp>
+      <p:sp>
+        <p:nvSpPr>
+          <p:cNvPr id="32" name="TextBox 31">
+            <a:extLst>
+              <a:ext uri="{FF2B5EF4-FFF2-40B4-BE49-F238E27FC236}">
+                <a16:creationId xmlns:a16="http://schemas.microsoft.com/office/drawing/2014/main" id="{4BAEAD9E-1D94-415F-B860-B20290B56A40}"/>
+              </a:ext>
+            </a:extLst>
+          </p:cNvPr>
+          <p:cNvSpPr txBox="1"/>
+          <p:nvPr/>
+        </p:nvSpPr>
+        <p:spPr>
+          <a:xfrm>
+            <a:off x="1982658" y="346434"/>
+            <a:ext cx="1074653" cy="276999"/>
+          </a:xfrm>
+          <a:prstGeom prst="rect">
+            <a:avLst/>
+          </a:prstGeom>
+          <a:solidFill>
+            <a:schemeClr val="bg1"/>
+          </a:solidFill>
+          <a:ln w="12700">
+            <a:solidFill>
+              <a:schemeClr val="accent1"/>
+            </a:solidFill>
+            <a:prstDash val="sysDot"/>
+          </a:ln>
+        </p:spPr>
+        <p:txBody>
+          <a:bodyPr wrap="none" rtlCol="0">
+            <a:spAutoFit/>
+          </a:bodyPr>
+          <a:lstStyle/>
+          <a:p>
+            <a:r>
+              <a:rPr lang="en-US" sz="1200" dirty="0"/>
+              <a:t>Local machine</a:t>
+            </a:r>
           </a:p>
         </p:txBody>
       </p:sp>

</xml_diff>